<commit_message>
Lesson 3 Task 1
</commit_message>
<xml_diff>
--- a/Presentations/02 HTML Basics.pptx
+++ b/Presentations/02 HTML Basics.pptx
@@ -4101,7 +4101,7 @@
         </p:nvSpPr>
         <p:spPr>
           <a:xfrm>
-            <a:off x="381300" y="685800"/>
+            <a:off x="381000" y="685800"/>
             <a:ext cx="6096000" cy="3429000"/>
           </a:xfrm>
           <a:custGeom>
@@ -19330,40 +19330,72 @@
               <a:buNone/>
             </a:pPr>
             <a:r>
-              <a:rPr lang="en-GB"/>
-              <a:t>HTML images are defined with the &lt;img&gt; tag.</a:t>
+              <a:rPr lang="en-GB" dirty="0"/>
+              <a:t>HTML images are defined with the &lt;</a:t>
+            </a:r>
+            <a:r>
+              <a:rPr lang="en-GB" dirty="0" err="1"/>
+              <a:t>img</a:t>
+            </a:r>
+            <a:r>
+              <a:rPr lang="en-GB" dirty="0"/>
+              <a:t>&gt; tag.</a:t>
             </a:r>
             <a:br>
-              <a:rPr lang="en-GB"/>
+              <a:rPr lang="en-GB" dirty="0"/>
             </a:br>
             <a:br>
-              <a:rPr lang="en-GB"/>
+              <a:rPr lang="en-GB" dirty="0"/>
             </a:br>
             <a:r>
-              <a:rPr lang="en-GB"/>
-              <a:t>The source file (src), alternative text (alt), width, and height are provided as attributes:</a:t>
+              <a:rPr lang="en-GB" dirty="0"/>
+              <a:t>The source file (</a:t>
+            </a:r>
+            <a:r>
+              <a:rPr lang="en-GB" dirty="0" err="1"/>
+              <a:t>src</a:t>
+            </a:r>
+            <a:r>
+              <a:rPr lang="en-GB" dirty="0"/>
+              <a:t>), alternative text (alt), width, and height are provided as attributes:</a:t>
             </a:r>
             <a:br>
-              <a:rPr lang="en-GB"/>
+              <a:rPr lang="en-GB" dirty="0"/>
             </a:br>
             <a:br>
-              <a:rPr lang="en-GB"/>
+              <a:rPr lang="en-GB" dirty="0"/>
             </a:br>
             <a:r>
-              <a:rPr lang="en-GB"/>
+              <a:rPr lang="en-GB" dirty="0"/>
               <a:t>Example:</a:t>
             </a:r>
             <a:br>
-              <a:rPr lang="en-GB"/>
+              <a:rPr lang="en-GB" dirty="0"/>
             </a:br>
             <a:br>
-              <a:rPr lang="en-GB"/>
+              <a:rPr lang="en-GB" dirty="0"/>
             </a:br>
             <a:r>
-              <a:rPr lang="en-GB" b="1" i="1"/>
-              <a:t>&lt;img src="vum.jpg" alt="VUM" width="200" height="100"&gt;</a:t>
-            </a:r>
-            <a:endParaRPr b="1" i="1"/>
+              <a:rPr lang="en-GB" b="1" i="1" dirty="0"/>
+              <a:t>&lt;</a:t>
+            </a:r>
+            <a:r>
+              <a:rPr lang="en-GB" b="1" i="1" dirty="0" err="1"/>
+              <a:t>img</a:t>
+            </a:r>
+            <a:r>
+              <a:rPr lang="en-GB" b="1" i="1" dirty="0"/>
+              <a:t> </a:t>
+            </a:r>
+            <a:r>
+              <a:rPr lang="en-GB" b="1" i="1" dirty="0" err="1"/>
+              <a:t>src</a:t>
+            </a:r>
+            <a:r>
+              <a:rPr lang="en-GB" b="1" i="1" dirty="0"/>
+              <a:t>="vum.jpg" alt="VUM" width="200" height="100“  /&gt; </a:t>
+            </a:r>
+            <a:endParaRPr b="1" i="1" dirty="0"/>
           </a:p>
         </p:txBody>
       </p:sp>

</xml_diff>